<commit_message>
Moved description of seconds counter task to separate file
</commit_message>
<xml_diff>
--- a/Presentation/lesson-05.pptx
+++ b/Presentation/lesson-05.pptx
@@ -301,7 +301,7 @@
           <a:p>
             <a:fld id="{FAECF776-F836-4CCD-9497-99E5597B8B5D}" type="datetimeFigureOut">
               <a:rPr lang="en-US" smtClean="0"/>
-              <a:t>11/6/2012</a:t>
+              <a:t>11/8/2012</a:t>
             </a:fld>
             <a:endParaRPr lang="en-US"/>
           </a:p>
@@ -471,7 +471,7 @@
           <a:p>
             <a:fld id="{FAECF776-F836-4CCD-9497-99E5597B8B5D}" type="datetimeFigureOut">
               <a:rPr lang="en-US" smtClean="0"/>
-              <a:t>11/6/2012</a:t>
+              <a:t>11/8/2012</a:t>
             </a:fld>
             <a:endParaRPr lang="en-US"/>
           </a:p>
@@ -651,7 +651,7 @@
           <a:p>
             <a:fld id="{FAECF776-F836-4CCD-9497-99E5597B8B5D}" type="datetimeFigureOut">
               <a:rPr lang="en-US" smtClean="0"/>
-              <a:t>11/6/2012</a:t>
+              <a:t>11/8/2012</a:t>
             </a:fld>
             <a:endParaRPr lang="en-US"/>
           </a:p>
@@ -821,7 +821,7 @@
           <a:p>
             <a:fld id="{FAECF776-F836-4CCD-9497-99E5597B8B5D}" type="datetimeFigureOut">
               <a:rPr lang="en-US" smtClean="0"/>
-              <a:t>11/6/2012</a:t>
+              <a:t>11/8/2012</a:t>
             </a:fld>
             <a:endParaRPr lang="en-US"/>
           </a:p>
@@ -1067,7 +1067,7 @@
           <a:p>
             <a:fld id="{FAECF776-F836-4CCD-9497-99E5597B8B5D}" type="datetimeFigureOut">
               <a:rPr lang="en-US" smtClean="0"/>
-              <a:t>11/6/2012</a:t>
+              <a:t>11/8/2012</a:t>
             </a:fld>
             <a:endParaRPr lang="en-US"/>
           </a:p>
@@ -1355,7 +1355,7 @@
           <a:p>
             <a:fld id="{FAECF776-F836-4CCD-9497-99E5597B8B5D}" type="datetimeFigureOut">
               <a:rPr lang="en-US" smtClean="0"/>
-              <a:t>11/6/2012</a:t>
+              <a:t>11/8/2012</a:t>
             </a:fld>
             <a:endParaRPr lang="en-US"/>
           </a:p>
@@ -1777,7 +1777,7 @@
           <a:p>
             <a:fld id="{FAECF776-F836-4CCD-9497-99E5597B8B5D}" type="datetimeFigureOut">
               <a:rPr lang="en-US" smtClean="0"/>
-              <a:t>11/6/2012</a:t>
+              <a:t>11/8/2012</a:t>
             </a:fld>
             <a:endParaRPr lang="en-US"/>
           </a:p>
@@ -1895,7 +1895,7 @@
           <a:p>
             <a:fld id="{FAECF776-F836-4CCD-9497-99E5597B8B5D}" type="datetimeFigureOut">
               <a:rPr lang="en-US" smtClean="0"/>
-              <a:t>11/6/2012</a:t>
+              <a:t>11/8/2012</a:t>
             </a:fld>
             <a:endParaRPr lang="en-US"/>
           </a:p>
@@ -1990,7 +1990,7 @@
           <a:p>
             <a:fld id="{FAECF776-F836-4CCD-9497-99E5597B8B5D}" type="datetimeFigureOut">
               <a:rPr lang="en-US" smtClean="0"/>
-              <a:t>11/6/2012</a:t>
+              <a:t>11/8/2012</a:t>
             </a:fld>
             <a:endParaRPr lang="en-US"/>
           </a:p>
@@ -2267,7 +2267,7 @@
           <a:p>
             <a:fld id="{FAECF776-F836-4CCD-9497-99E5597B8B5D}" type="datetimeFigureOut">
               <a:rPr lang="en-US" smtClean="0"/>
-              <a:t>11/6/2012</a:t>
+              <a:t>11/8/2012</a:t>
             </a:fld>
             <a:endParaRPr lang="en-US"/>
           </a:p>
@@ -2520,7 +2520,7 @@
           <a:p>
             <a:fld id="{FAECF776-F836-4CCD-9497-99E5597B8B5D}" type="datetimeFigureOut">
               <a:rPr lang="en-US" smtClean="0"/>
-              <a:t>11/6/2012</a:t>
+              <a:t>11/8/2012</a:t>
             </a:fld>
             <a:endParaRPr lang="en-US"/>
           </a:p>
@@ -2733,7 +2733,7 @@
           <a:p>
             <a:fld id="{FAECF776-F836-4CCD-9497-99E5597B8B5D}" type="datetimeFigureOut">
               <a:rPr lang="en-US" smtClean="0"/>
-              <a:t>11/6/2012</a:t>
+              <a:t>11/8/2012</a:t>
             </a:fld>
             <a:endParaRPr lang="en-US"/>
           </a:p>
@@ -7789,7 +7789,7 @@
         <p:spPr bwMode="auto">
           <a:xfrm>
             <a:off x="152400" y="620688"/>
-            <a:ext cx="8839200" cy="1754326"/>
+            <a:ext cx="8839200" cy="369332"/>
           </a:xfrm>
           <a:prstGeom prst="rect">
             <a:avLst/>
@@ -7923,10 +7923,16 @@
           <a:p>
             <a:pPr eaLnBrk="1" hangingPunct="1"/>
             <a:r>
+              <a:rPr lang="ru-RU" i="1" dirty="0" smtClean="0">
+                <a:cs typeface="Arial" charset="0"/>
+              </a:rPr>
+              <a:t>Создание </a:t>
+            </a:r>
+            <a:r>
               <a:rPr lang="ru-RU" i="1" dirty="0">
                 <a:cs typeface="Arial" charset="0"/>
               </a:rPr>
-              <a:t>	Создание класса </a:t>
+              <a:t>класса </a:t>
             </a:r>
             <a:r>
               <a:rPr lang="en-US" i="1" dirty="0">
@@ -7941,94 +7947,22 @@
               <a:t>Секундомер</a:t>
             </a:r>
             <a:r>
+              <a:rPr lang="en-US" i="1" dirty="0" smtClean="0">
+                <a:cs typeface="Arial" charset="0"/>
+              </a:rPr>
+              <a:t>”</a:t>
+            </a:r>
+            <a:r>
+              <a:rPr lang="ru-RU" i="1" dirty="0" smtClean="0">
+                <a:cs typeface="Arial" charset="0"/>
+              </a:rPr>
+              <a:t> - </a:t>
+            </a:r>
+            <a:r>
               <a:rPr lang="en-US" i="1" dirty="0">
                 <a:cs typeface="Arial" charset="0"/>
               </a:rPr>
-              <a:t>”</a:t>
-            </a:r>
-            <a:r>
-              <a:rPr lang="ru-RU" i="1" dirty="0">
-                <a:cs typeface="Arial" charset="0"/>
-              </a:rPr>
-              <a:t>, используя события и объект класса </a:t>
-            </a:r>
-            <a:r>
-              <a:rPr lang="en-US" i="1" dirty="0">
-                <a:cs typeface="Arial" charset="0"/>
-              </a:rPr>
-              <a:t>Timer</a:t>
-            </a:r>
-            <a:r>
-              <a:rPr lang="en-US" i="1" dirty="0" smtClean="0">
-                <a:cs typeface="Arial" charset="0"/>
-              </a:rPr>
-              <a:t>.</a:t>
-            </a:r>
-            <a:endParaRPr lang="ru-RU" i="1" dirty="0" smtClean="0">
-              <a:cs typeface="Arial" charset="0"/>
-            </a:endParaRPr>
-          </a:p>
-          <a:p>
-            <a:pPr eaLnBrk="1" hangingPunct="1"/>
-            <a:endParaRPr lang="ru-RU" i="1" dirty="0">
-              <a:cs typeface="Arial" charset="0"/>
-            </a:endParaRPr>
-          </a:p>
-          <a:p>
-            <a:pPr eaLnBrk="1" hangingPunct="1"/>
-            <a:r>
-              <a:rPr lang="ru-RU" i="1" dirty="0" smtClean="0">
-                <a:cs typeface="Arial" charset="0"/>
-              </a:rPr>
-              <a:t>Приложение </a:t>
-            </a:r>
-            <a:r>
-              <a:rPr lang="en-US" i="1" dirty="0" err="1" smtClean="0">
-                <a:cs typeface="Arial" charset="0"/>
-              </a:rPr>
-              <a:t>WindowsForms</a:t>
-            </a:r>
-            <a:endParaRPr lang="en-US" i="1" dirty="0" smtClean="0">
-              <a:cs typeface="Arial" charset="0"/>
-            </a:endParaRPr>
-          </a:p>
-          <a:p>
-            <a:pPr eaLnBrk="1" hangingPunct="1"/>
-            <a:endParaRPr lang="en-US" i="1" dirty="0">
-              <a:cs typeface="Arial" charset="0"/>
-            </a:endParaRPr>
-          </a:p>
-          <a:p>
-            <a:pPr eaLnBrk="1" hangingPunct="1"/>
-            <a:r>
-              <a:rPr lang="ru-RU" i="1" dirty="0" smtClean="0">
-                <a:cs typeface="Arial" charset="0"/>
-              </a:rPr>
-              <a:t>Для хранения промежутка времени используйте структуру </a:t>
-            </a:r>
-            <a:r>
-              <a:rPr lang="en-US" i="1" dirty="0" err="1" smtClean="0">
-                <a:cs typeface="Arial" charset="0"/>
-              </a:rPr>
-              <a:t>TimeSpan</a:t>
-            </a:r>
-            <a:r>
-              <a:rPr lang="ru-RU" i="1" dirty="0" smtClean="0">
-                <a:cs typeface="Arial" charset="0"/>
-              </a:rPr>
-              <a:t>. Для форматированного вывода </a:t>
-            </a:r>
-            <a:r>
-              <a:rPr lang="en-US" i="1" dirty="0" err="1" smtClean="0">
-                <a:cs typeface="Arial" charset="0"/>
-              </a:rPr>
-              <a:t>String.Format</a:t>
-            </a:r>
-            <a:r>
-              <a:rPr lang="en-US" i="1" dirty="0" smtClean="0">
-                <a:cs typeface="Arial" charset="0"/>
-              </a:rPr>
-              <a:t>()</a:t>
+              <a:t>task-gui-seconds-counter.docx</a:t>
             </a:r>
             <a:endParaRPr lang="en-US" i="1" dirty="0">
               <a:cs typeface="Arial" charset="0"/>

</xml_diff>